<commit_message>
new version of fig s4
</commit_message>
<xml_diff>
--- a/Figures/PlayingAroundWithHubs.pptx
+++ b/Figures/PlayingAroundWithHubs.pptx
@@ -267,7 +267,7 @@
           <a:p>
             <a:fld id="{EF85D3E6-8DBD-40D8-8E98-DE404A5510D9}" type="datetimeFigureOut">
               <a:rPr lang="en-US" smtClean="0"/>
-              <a:t>9/15/2023</a:t>
+              <a:t>9/18/2023</a:t>
             </a:fld>
             <a:endParaRPr lang="en-US"/>
           </a:p>
@@ -465,7 +465,7 @@
           <a:p>
             <a:fld id="{EF85D3E6-8DBD-40D8-8E98-DE404A5510D9}" type="datetimeFigureOut">
               <a:rPr lang="en-US" smtClean="0"/>
-              <a:t>9/15/2023</a:t>
+              <a:t>9/18/2023</a:t>
             </a:fld>
             <a:endParaRPr lang="en-US"/>
           </a:p>
@@ -673,7 +673,7 @@
           <a:p>
             <a:fld id="{EF85D3E6-8DBD-40D8-8E98-DE404A5510D9}" type="datetimeFigureOut">
               <a:rPr lang="en-US" smtClean="0"/>
-              <a:t>9/15/2023</a:t>
+              <a:t>9/18/2023</a:t>
             </a:fld>
             <a:endParaRPr lang="en-US"/>
           </a:p>
@@ -871,7 +871,7 @@
           <a:p>
             <a:fld id="{EF85D3E6-8DBD-40D8-8E98-DE404A5510D9}" type="datetimeFigureOut">
               <a:rPr lang="en-US" smtClean="0"/>
-              <a:t>9/15/2023</a:t>
+              <a:t>9/18/2023</a:t>
             </a:fld>
             <a:endParaRPr lang="en-US"/>
           </a:p>
@@ -1146,7 +1146,7 @@
           <a:p>
             <a:fld id="{EF85D3E6-8DBD-40D8-8E98-DE404A5510D9}" type="datetimeFigureOut">
               <a:rPr lang="en-US" smtClean="0"/>
-              <a:t>9/15/2023</a:t>
+              <a:t>9/18/2023</a:t>
             </a:fld>
             <a:endParaRPr lang="en-US"/>
           </a:p>
@@ -1411,7 +1411,7 @@
           <a:p>
             <a:fld id="{EF85D3E6-8DBD-40D8-8E98-DE404A5510D9}" type="datetimeFigureOut">
               <a:rPr lang="en-US" smtClean="0"/>
-              <a:t>9/15/2023</a:t>
+              <a:t>9/18/2023</a:t>
             </a:fld>
             <a:endParaRPr lang="en-US"/>
           </a:p>
@@ -1823,7 +1823,7 @@
           <a:p>
             <a:fld id="{EF85D3E6-8DBD-40D8-8E98-DE404A5510D9}" type="datetimeFigureOut">
               <a:rPr lang="en-US" smtClean="0"/>
-              <a:t>9/15/2023</a:t>
+              <a:t>9/18/2023</a:t>
             </a:fld>
             <a:endParaRPr lang="en-US"/>
           </a:p>
@@ -1964,7 +1964,7 @@
           <a:p>
             <a:fld id="{EF85D3E6-8DBD-40D8-8E98-DE404A5510D9}" type="datetimeFigureOut">
               <a:rPr lang="en-US" smtClean="0"/>
-              <a:t>9/15/2023</a:t>
+              <a:t>9/18/2023</a:t>
             </a:fld>
             <a:endParaRPr lang="en-US"/>
           </a:p>
@@ -2077,7 +2077,7 @@
           <a:p>
             <a:fld id="{EF85D3E6-8DBD-40D8-8E98-DE404A5510D9}" type="datetimeFigureOut">
               <a:rPr lang="en-US" smtClean="0"/>
-              <a:t>9/15/2023</a:t>
+              <a:t>9/18/2023</a:t>
             </a:fld>
             <a:endParaRPr lang="en-US"/>
           </a:p>
@@ -2388,7 +2388,7 @@
           <a:p>
             <a:fld id="{EF85D3E6-8DBD-40D8-8E98-DE404A5510D9}" type="datetimeFigureOut">
               <a:rPr lang="en-US" smtClean="0"/>
-              <a:t>9/15/2023</a:t>
+              <a:t>9/18/2023</a:t>
             </a:fld>
             <a:endParaRPr lang="en-US"/>
           </a:p>
@@ -2676,7 +2676,7 @@
           <a:p>
             <a:fld id="{EF85D3E6-8DBD-40D8-8E98-DE404A5510D9}" type="datetimeFigureOut">
               <a:rPr lang="en-US" smtClean="0"/>
-              <a:t>9/15/2023</a:t>
+              <a:t>9/18/2023</a:t>
             </a:fld>
             <a:endParaRPr lang="en-US"/>
           </a:p>
@@ -2917,7 +2917,7 @@
           <a:p>
             <a:fld id="{EF85D3E6-8DBD-40D8-8E98-DE404A5510D9}" type="datetimeFigureOut">
               <a:rPr lang="en-US" smtClean="0"/>
-              <a:t>9/15/2023</a:t>
+              <a:t>9/18/2023</a:t>
             </a:fld>
             <a:endParaRPr lang="en-US"/>
           </a:p>
@@ -6294,394 +6294,6 @@
           </a:p>
         </p:txBody>
       </p:sp>
-      <p:sp>
-        <p:nvSpPr>
-          <p:cNvPr id="15" name="TextBox 14">
-            <a:extLst>
-              <a:ext uri="{FF2B5EF4-FFF2-40B4-BE49-F238E27FC236}">
-                <a16:creationId xmlns:a16="http://schemas.microsoft.com/office/drawing/2014/main" id="{996C943A-D19D-9DB5-8EA8-2B6E64D98F1A}"/>
-              </a:ext>
-            </a:extLst>
-          </p:cNvPr>
-          <p:cNvSpPr txBox="1"/>
-          <p:nvPr/>
-        </p:nvSpPr>
-        <p:spPr>
-          <a:xfrm>
-            <a:off x="7152321" y="4421221"/>
-            <a:ext cx="2133600" cy="400110"/>
-          </a:xfrm>
-          <a:prstGeom prst="rect">
-            <a:avLst/>
-          </a:prstGeom>
-          <a:noFill/>
-        </p:spPr>
-        <p:txBody>
-          <a:bodyPr wrap="square" rtlCol="0">
-            <a:spAutoFit/>
-          </a:bodyPr>
-          <a:lstStyle/>
-          <a:p>
-            <a:r>
-              <a:rPr lang="en-US" sz="2000" dirty="0">
-                <a:solidFill>
-                  <a:srgbClr val="00B0F0"/>
-                </a:solidFill>
-                <a:latin typeface="Arial" panose="020B0604020202020204" pitchFamily="34" charset="0"/>
-                <a:cs typeface="Arial" panose="020B0604020202020204" pitchFamily="34" charset="0"/>
-              </a:rPr>
-              <a:t>Darien</a:t>
-            </a:r>
-          </a:p>
-        </p:txBody>
-      </p:sp>
-      <p:sp>
-        <p:nvSpPr>
-          <p:cNvPr id="16" name="TextBox 15">
-            <a:extLst>
-              <a:ext uri="{FF2B5EF4-FFF2-40B4-BE49-F238E27FC236}">
-                <a16:creationId xmlns:a16="http://schemas.microsoft.com/office/drawing/2014/main" id="{C40EB05F-AA4A-87F9-6E8D-606207FCB788}"/>
-              </a:ext>
-            </a:extLst>
-          </p:cNvPr>
-          <p:cNvSpPr txBox="1"/>
-          <p:nvPr/>
-        </p:nvSpPr>
-        <p:spPr>
-          <a:xfrm>
-            <a:off x="4668253" y="5209386"/>
-            <a:ext cx="2367763" cy="707886"/>
-          </a:xfrm>
-          <a:prstGeom prst="rect">
-            <a:avLst/>
-          </a:prstGeom>
-          <a:noFill/>
-        </p:spPr>
-        <p:txBody>
-          <a:bodyPr wrap="square" rtlCol="0">
-            <a:spAutoFit/>
-          </a:bodyPr>
-          <a:lstStyle/>
-          <a:p>
-            <a:r>
-              <a:rPr lang="en-US" sz="2000" dirty="0" err="1">
-                <a:solidFill>
-                  <a:srgbClr val="00B0F0"/>
-                </a:solidFill>
-                <a:latin typeface="Arial" panose="020B0604020202020204" pitchFamily="34" charset="0"/>
-                <a:cs typeface="Arial" panose="020B0604020202020204" pitchFamily="34" charset="0"/>
-              </a:rPr>
-              <a:t>AmistOsa</a:t>
-            </a:r>
-            <a:r>
-              <a:rPr lang="en-US" sz="2000" dirty="0">
-                <a:solidFill>
-                  <a:srgbClr val="00B0F0"/>
-                </a:solidFill>
-                <a:latin typeface="Arial" panose="020B0604020202020204" pitchFamily="34" charset="0"/>
-                <a:cs typeface="Arial" panose="020B0604020202020204" pitchFamily="34" charset="0"/>
-              </a:rPr>
-              <a:t>/</a:t>
-            </a:r>
-          </a:p>
-          <a:p>
-            <a:r>
-              <a:rPr lang="en-US" sz="2000" dirty="0">
-                <a:solidFill>
-                  <a:srgbClr val="00B0F0"/>
-                </a:solidFill>
-                <a:latin typeface="Arial" panose="020B0604020202020204" pitchFamily="34" charset="0"/>
-                <a:cs typeface="Arial" panose="020B0604020202020204" pitchFamily="34" charset="0"/>
-              </a:rPr>
-              <a:t>Palo Seco-Amistad</a:t>
-            </a:r>
-          </a:p>
-        </p:txBody>
-      </p:sp>
-      <p:sp>
-        <p:nvSpPr>
-          <p:cNvPr id="17" name="TextBox 16">
-            <a:extLst>
-              <a:ext uri="{FF2B5EF4-FFF2-40B4-BE49-F238E27FC236}">
-                <a16:creationId xmlns:a16="http://schemas.microsoft.com/office/drawing/2014/main" id="{B5696B72-9774-D6C2-93AC-C83EF97C80D5}"/>
-              </a:ext>
-            </a:extLst>
-          </p:cNvPr>
-          <p:cNvSpPr txBox="1"/>
-          <p:nvPr/>
-        </p:nvSpPr>
-        <p:spPr>
-          <a:xfrm>
-            <a:off x="5441688" y="3549447"/>
-            <a:ext cx="3300663" cy="400110"/>
-          </a:xfrm>
-          <a:prstGeom prst="rect">
-            <a:avLst/>
-          </a:prstGeom>
-          <a:noFill/>
-        </p:spPr>
-        <p:txBody>
-          <a:bodyPr wrap="square">
-            <a:spAutoFit/>
-          </a:bodyPr>
-          <a:lstStyle/>
-          <a:p>
-            <a:r>
-              <a:rPr lang="en-US" sz="2000" dirty="0">
-                <a:solidFill>
-                  <a:srgbClr val="00B0F0"/>
-                </a:solidFill>
-                <a:latin typeface="Arial" panose="020B0604020202020204" pitchFamily="34" charset="0"/>
-                <a:cs typeface="Arial" panose="020B0604020202020204" pitchFamily="34" charset="0"/>
-              </a:rPr>
-              <a:t>Indio </a:t>
-            </a:r>
-            <a:r>
-              <a:rPr lang="en-US" sz="2000" dirty="0" err="1">
-                <a:solidFill>
-                  <a:srgbClr val="00B0F0"/>
-                </a:solidFill>
-                <a:latin typeface="Arial" panose="020B0604020202020204" pitchFamily="34" charset="0"/>
-                <a:cs typeface="Arial" panose="020B0604020202020204" pitchFamily="34" charset="0"/>
-              </a:rPr>
-              <a:t>Maiz</a:t>
-            </a:r>
-            <a:r>
-              <a:rPr lang="en-US" sz="2000" dirty="0">
-                <a:solidFill>
-                  <a:srgbClr val="00B0F0"/>
-                </a:solidFill>
-                <a:latin typeface="Arial" panose="020B0604020202020204" pitchFamily="34" charset="0"/>
-                <a:cs typeface="Arial" panose="020B0604020202020204" pitchFamily="34" charset="0"/>
-              </a:rPr>
-              <a:t>-Braulio Carrillo </a:t>
-            </a:r>
-          </a:p>
-        </p:txBody>
-      </p:sp>
-      <p:sp>
-        <p:nvSpPr>
-          <p:cNvPr id="18" name="TextBox 17">
-            <a:extLst>
-              <a:ext uri="{FF2B5EF4-FFF2-40B4-BE49-F238E27FC236}">
-                <a16:creationId xmlns:a16="http://schemas.microsoft.com/office/drawing/2014/main" id="{77A2C6DA-F988-6FD0-0322-17E1586B61CA}"/>
-              </a:ext>
-            </a:extLst>
-          </p:cNvPr>
-          <p:cNvSpPr txBox="1"/>
-          <p:nvPr/>
-        </p:nvSpPr>
-        <p:spPr>
-          <a:xfrm>
-            <a:off x="5059557" y="1994829"/>
-            <a:ext cx="3300663" cy="400110"/>
-          </a:xfrm>
-          <a:prstGeom prst="rect">
-            <a:avLst/>
-          </a:prstGeom>
-          <a:noFill/>
-        </p:spPr>
-        <p:txBody>
-          <a:bodyPr wrap="square">
-            <a:spAutoFit/>
-          </a:bodyPr>
-          <a:lstStyle/>
-          <a:p>
-            <a:r>
-              <a:rPr lang="en-US" sz="2000" dirty="0" err="1">
-                <a:solidFill>
-                  <a:srgbClr val="00B0F0"/>
-                </a:solidFill>
-                <a:latin typeface="Arial" panose="020B0604020202020204" pitchFamily="34" charset="0"/>
-                <a:cs typeface="Arial" panose="020B0604020202020204" pitchFamily="34" charset="0"/>
-              </a:rPr>
-              <a:t>Platano-Agalta</a:t>
-            </a:r>
-            <a:endParaRPr lang="en-US" sz="2000" dirty="0">
-              <a:solidFill>
-                <a:srgbClr val="00B0F0"/>
-              </a:solidFill>
-              <a:latin typeface="Arial" panose="020B0604020202020204" pitchFamily="34" charset="0"/>
-              <a:cs typeface="Arial" panose="020B0604020202020204" pitchFamily="34" charset="0"/>
-            </a:endParaRPr>
-          </a:p>
-        </p:txBody>
-      </p:sp>
-      <p:sp>
-        <p:nvSpPr>
-          <p:cNvPr id="19" name="TextBox 18">
-            <a:extLst>
-              <a:ext uri="{FF2B5EF4-FFF2-40B4-BE49-F238E27FC236}">
-                <a16:creationId xmlns:a16="http://schemas.microsoft.com/office/drawing/2014/main" id="{BC939E54-9CFB-49A8-9948-E18BE07EF2C2}"/>
-              </a:ext>
-            </a:extLst>
-          </p:cNvPr>
-          <p:cNvSpPr txBox="1"/>
-          <p:nvPr/>
-        </p:nvSpPr>
-        <p:spPr>
-          <a:xfrm>
-            <a:off x="624599" y="418015"/>
-            <a:ext cx="3300663" cy="400110"/>
-          </a:xfrm>
-          <a:prstGeom prst="rect">
-            <a:avLst/>
-          </a:prstGeom>
-          <a:noFill/>
-        </p:spPr>
-        <p:txBody>
-          <a:bodyPr wrap="square">
-            <a:spAutoFit/>
-          </a:bodyPr>
-          <a:lstStyle/>
-          <a:p>
-            <a:r>
-              <a:rPr lang="en-US" sz="2000" dirty="0">
-                <a:solidFill>
-                  <a:srgbClr val="00B0F0"/>
-                </a:solidFill>
-                <a:latin typeface="Arial" panose="020B0604020202020204" pitchFamily="34" charset="0"/>
-                <a:cs typeface="Arial" panose="020B0604020202020204" pitchFamily="34" charset="0"/>
-              </a:rPr>
-              <a:t>Maya-Montebello</a:t>
-            </a:r>
-          </a:p>
-        </p:txBody>
-      </p:sp>
-      <p:sp>
-        <p:nvSpPr>
-          <p:cNvPr id="20" name="TextBox 19">
-            <a:extLst>
-              <a:ext uri="{FF2B5EF4-FFF2-40B4-BE49-F238E27FC236}">
-                <a16:creationId xmlns:a16="http://schemas.microsoft.com/office/drawing/2014/main" id="{9E3E9AC6-CA3E-2549-BD4A-C854E91006CF}"/>
-              </a:ext>
-            </a:extLst>
-          </p:cNvPr>
-          <p:cNvSpPr txBox="1"/>
-          <p:nvPr/>
-        </p:nvSpPr>
-        <p:spPr>
-          <a:xfrm>
-            <a:off x="4527885" y="1427946"/>
-            <a:ext cx="3300663" cy="400110"/>
-          </a:xfrm>
-          <a:prstGeom prst="rect">
-            <a:avLst/>
-          </a:prstGeom>
-          <a:noFill/>
-        </p:spPr>
-        <p:txBody>
-          <a:bodyPr wrap="square">
-            <a:spAutoFit/>
-          </a:bodyPr>
-          <a:lstStyle/>
-          <a:p>
-            <a:r>
-              <a:rPr lang="en-US" sz="2000" dirty="0" err="1">
-                <a:solidFill>
-                  <a:srgbClr val="00B0F0"/>
-                </a:solidFill>
-                <a:latin typeface="Arial" panose="020B0604020202020204" pitchFamily="34" charset="0"/>
-                <a:cs typeface="Arial" panose="020B0604020202020204" pitchFamily="34" charset="0"/>
-              </a:rPr>
-              <a:t>Chiquibui</a:t>
-            </a:r>
-            <a:r>
-              <a:rPr lang="en-US" sz="2000" dirty="0">
-                <a:solidFill>
-                  <a:srgbClr val="00B0F0"/>
-                </a:solidFill>
-                <a:latin typeface="Arial" panose="020B0604020202020204" pitchFamily="34" charset="0"/>
-                <a:cs typeface="Arial" panose="020B0604020202020204" pitchFamily="34" charset="0"/>
-              </a:rPr>
-              <a:t>-Las Minas</a:t>
-            </a:r>
-          </a:p>
-        </p:txBody>
-      </p:sp>
-      <p:cxnSp>
-        <p:nvCxnSpPr>
-          <p:cNvPr id="21" name="Straight Arrow Connector 20">
-            <a:extLst>
-              <a:ext uri="{FF2B5EF4-FFF2-40B4-BE49-F238E27FC236}">
-                <a16:creationId xmlns:a16="http://schemas.microsoft.com/office/drawing/2014/main" id="{98D328DE-3F3E-F74F-1402-DDDE1051FACF}"/>
-              </a:ext>
-            </a:extLst>
-          </p:cNvPr>
-          <p:cNvCxnSpPr/>
-          <p:nvPr/>
-        </p:nvCxnSpPr>
-        <p:spPr>
-          <a:xfrm>
-            <a:off x="2404429" y="769999"/>
-            <a:ext cx="284260" cy="641707"/>
-          </a:xfrm>
-          <a:prstGeom prst="straightConnector1">
-            <a:avLst/>
-          </a:prstGeom>
-          <a:ln w="57150">
-            <a:solidFill>
-              <a:srgbClr val="00B0F0"/>
-            </a:solidFill>
-            <a:tailEnd type="triangle"/>
-          </a:ln>
-        </p:spPr>
-        <p:style>
-          <a:lnRef idx="1">
-            <a:schemeClr val="accent1"/>
-          </a:lnRef>
-          <a:fillRef idx="0">
-            <a:schemeClr val="accent1"/>
-          </a:fillRef>
-          <a:effectRef idx="0">
-            <a:schemeClr val="accent1"/>
-          </a:effectRef>
-          <a:fontRef idx="minor">
-            <a:schemeClr val="tx1"/>
-          </a:fontRef>
-        </p:style>
-      </p:cxnSp>
-      <p:sp>
-        <p:nvSpPr>
-          <p:cNvPr id="24" name="TextBox 23">
-            <a:extLst>
-              <a:ext uri="{FF2B5EF4-FFF2-40B4-BE49-F238E27FC236}">
-                <a16:creationId xmlns:a16="http://schemas.microsoft.com/office/drawing/2014/main" id="{DC08AFF7-4906-F9C1-2DDC-19E0D3E62475}"/>
-              </a:ext>
-            </a:extLst>
-          </p:cNvPr>
-          <p:cNvSpPr txBox="1"/>
-          <p:nvPr/>
-        </p:nvSpPr>
-        <p:spPr>
-          <a:xfrm>
-            <a:off x="1352280" y="3008388"/>
-            <a:ext cx="3300663" cy="400110"/>
-          </a:xfrm>
-          <a:prstGeom prst="rect">
-            <a:avLst/>
-          </a:prstGeom>
-          <a:noFill/>
-        </p:spPr>
-        <p:txBody>
-          <a:bodyPr wrap="square">
-            <a:spAutoFit/>
-          </a:bodyPr>
-          <a:lstStyle/>
-          <a:p>
-            <a:r>
-              <a:rPr lang="en-US" sz="2000" dirty="0">
-                <a:solidFill>
-                  <a:srgbClr val="00B0F0"/>
-                </a:solidFill>
-                <a:latin typeface="Arial" panose="020B0604020202020204" pitchFamily="34" charset="0"/>
-                <a:cs typeface="Arial" panose="020B0604020202020204" pitchFamily="34" charset="0"/>
-              </a:rPr>
-              <a:t>SW Guatemala</a:t>
-            </a:r>
-          </a:p>
-        </p:txBody>
-      </p:sp>
     </p:spTree>
     <p:extLst>
       <p:ext uri="{BB962C8B-B14F-4D97-AF65-F5344CB8AC3E}">

</xml_diff>